<commit_message>
microlecture on yoshi. Updates slides page
</commit_message>
<xml_diff>
--- a/slides/EnemyDesign.pptx
+++ b/slides/EnemyDesign.pptx
@@ -4178,6 +4178,13 @@
             <a:pPr lvl="1"/>
             <a:r>
               <a:rPr lang="en-US" dirty="0"/>
+              <a:t>Wiggling</a:t>
+            </a:r>
+          </a:p>
+          <a:p>
+            <a:pPr lvl="1"/>
+            <a:r>
+              <a:rPr lang="en-US" dirty="0"/>
               <a:t>Dead</a:t>
             </a:r>
           </a:p>
@@ -4605,7 +4612,7 @@
             <a:pPr lvl="1"/>
             <a:r>
               <a:rPr lang="en-US" dirty="0"/>
-              <a:t>Dying: Health=0, goes into a rage and gets faster and stronger. Dies as soon as he picks up </a:t>
+              <a:t>Dying: Health=0, goes into a rage and gets faster and stronger. Dies as soon as picks up </a:t>
             </a:r>
             <a:r>
               <a:rPr lang="en-US" dirty="0" err="1"/>

</xml_diff>